<commit_message>
Second version. It can read existing CSV file and check which field is to be used for search
</commit_message>
<xml_diff>
--- a/Vlookup utility.pptx
+++ b/Vlookup utility.pptx
@@ -104,6 +104,11 @@
       </a:defRPr>
     </a:lvl9pPr>
   </p:defaultTextStyle>
+  <p:extLst>
+    <p:ext uri="{EFAFB233-063F-42B5-8137-9DF3F51BA10A}">
+      <p15:sldGuideLst xmlns:p15="http://schemas.microsoft.com/office/powerpoint/2012/main"/>
+    </p:ext>
+  </p:extLst>
 </p:presentation>
 </file>
 
@@ -3124,7 +3129,15 @@
             </a:pPr>
             <a:r>
               <a:rPr lang="en-US" sz="1200" dirty="0" smtClean="0"/>
-              <a:t>Extract the provided zip file into a folder. Populate the properties file in the folder with the details of the Salesforce Org you want to lookup the Ids from.  Please the input data file in the same folder. Click the RunVlookup.bat file on your windows machine to invoke the logic in the JAR file</a:t>
+              <a:t>Extract the provided zip file into a folder. Populate the properties file in the folder with the details of the Salesforce Org you want to lookup the Ids from.  </a:t>
+            </a:r>
+            <a:r>
+              <a:rPr lang="en-US" sz="1200" dirty="0" smtClean="0"/>
+              <a:t>Place </a:t>
+            </a:r>
+            <a:r>
+              <a:rPr lang="en-US" sz="1200" dirty="0" smtClean="0"/>
+              <a:t>the input data file in the same folder. Click the RunVlookup.bat file on your windows machine to invoke the logic in the JAR file</a:t>
             </a:r>
           </a:p>
           <a:p>
@@ -3208,7 +3221,15 @@
             </a:r>
             <a:r>
               <a:rPr lang="en-US" sz="1200" dirty="0" smtClean="0"/>
-              <a:t>- the input file should be a CSV file with only the one field data that you want to search with. A sample input file is provided "</a:t>
+              <a:t>- the input file should be a CSV </a:t>
+            </a:r>
+            <a:r>
+              <a:rPr lang="en-US" sz="1200" dirty="0" smtClean="0"/>
+              <a:t>file. There should be a column with the field </a:t>
+            </a:r>
+            <a:r>
+              <a:rPr lang="en-US" sz="1200" dirty="0" smtClean="0"/>
+              <a:t>data that you want to search with. A sample input file is provided "</a:t>
             </a:r>
             <a:r>
               <a:rPr lang="en-US" sz="1200" dirty="0" err="1" smtClean="0"/>
@@ -3216,8 +3237,13 @@
             </a:r>
             <a:r>
               <a:rPr lang="en-US" sz="1200" dirty="0" smtClean="0"/>
-              <a:t>“. This sample file is for searching Profile object with field Name and  return Ids for each row.</a:t>
-            </a:r>
+              <a:t>“. This sample file is for searching Profile object with field Name and  return Ids for each row</a:t>
+            </a:r>
+            <a:r>
+              <a:rPr lang="en-US" sz="1200" dirty="0" smtClean="0"/>
+              <a:t>. </a:t>
+            </a:r>
+            <a:endParaRPr lang="en-US" sz="1200" dirty="0" smtClean="0"/>
           </a:p>
           <a:p>
             <a:pPr>
@@ -3227,8 +3253,33 @@
             </a:pPr>
             <a:r>
               <a:rPr lang="en-US" sz="1200" dirty="0" smtClean="0"/>
-              <a:t>Place the input file in same folder containing the utility files.</a:t>
-            </a:r>
+              <a:t>Place the input file in same folder containing the utility files</a:t>
+            </a:r>
+            <a:r>
+              <a:rPr lang="en-US" sz="1200" dirty="0" smtClean="0"/>
+              <a:t>. Please close the input file if it is open in excel or any other notepad/</a:t>
+            </a:r>
+            <a:r>
+              <a:rPr lang="en-US" sz="1200" dirty="0" err="1" smtClean="0"/>
+              <a:t>textpad</a:t>
+            </a:r>
+            <a:r>
+              <a:rPr lang="en-US" sz="1200" smtClean="0"/>
+              <a:t>/etc.</a:t>
+            </a:r>
+            <a:endParaRPr lang="en-US" sz="1200" dirty="0" smtClean="0"/>
+          </a:p>
+          <a:p>
+            <a:pPr>
+              <a:spcBef>
+                <a:spcPts val="600"/>
+              </a:spcBef>
+            </a:pPr>
+            <a:r>
+              <a:rPr lang="en-US" sz="1200" dirty="0" smtClean="0"/>
+              <a:t>The output Record Id is captured as the last column of the file.</a:t>
+            </a:r>
+            <a:endParaRPr lang="en-US" sz="1200" dirty="0" smtClean="0"/>
           </a:p>
           <a:p>
             <a:pPr marL="0" indent="0">

</xml_diff>